<commit_message>
todo del lunes 4
</commit_message>
<xml_diff>
--- a/Gestión/Ana/SAP, Odoo y webERP.pptx
+++ b/Gestión/Ana/SAP, Odoo y webERP.pptx
@@ -8,15 +8,19 @@
     <p:sldId id="256" r:id="rId2"/>
     <p:sldId id="258" r:id="rId3"/>
     <p:sldId id="259" r:id="rId4"/>
-    <p:sldId id="262" r:id="rId5"/>
-    <p:sldId id="267" r:id="rId6"/>
-    <p:sldId id="263" r:id="rId7"/>
-    <p:sldId id="260" r:id="rId8"/>
-    <p:sldId id="261" r:id="rId9"/>
-    <p:sldId id="264" r:id="rId10"/>
-    <p:sldId id="266" r:id="rId11"/>
-    <p:sldId id="269" r:id="rId12"/>
-    <p:sldId id="268" r:id="rId13"/>
+    <p:sldId id="270" r:id="rId5"/>
+    <p:sldId id="262" r:id="rId6"/>
+    <p:sldId id="267" r:id="rId7"/>
+    <p:sldId id="263" r:id="rId8"/>
+    <p:sldId id="272" r:id="rId9"/>
+    <p:sldId id="271" r:id="rId10"/>
+    <p:sldId id="273" r:id="rId11"/>
+    <p:sldId id="260" r:id="rId12"/>
+    <p:sldId id="261" r:id="rId13"/>
+    <p:sldId id="264" r:id="rId14"/>
+    <p:sldId id="266" r:id="rId15"/>
+    <p:sldId id="269" r:id="rId16"/>
+    <p:sldId id="268" r:id="rId17"/>
   </p:sldIdLst>
   <p:sldSz cx="9144000" cy="6858000" type="screen4x3"/>
   <p:notesSz cx="6858000" cy="9144000"/>
@@ -338,7 +342,7 @@
             <a:fld id="{ABDC6CF3-9851-4DA6-B475-A3385B82C582}" type="datetimeFigureOut">
               <a:rPr lang="es-ES" smtClean="0"/>
               <a:pPr/>
-              <a:t>27/09/2021</a:t>
+              <a:t>04/10/2021</a:t>
             </a:fld>
             <a:endParaRPr lang="es-ES"/>
           </a:p>
@@ -527,7 +531,7 @@
             <a:fld id="{ABDC6CF3-9851-4DA6-B475-A3385B82C582}" type="datetimeFigureOut">
               <a:rPr lang="es-ES" smtClean="0"/>
               <a:pPr/>
-              <a:t>27/09/2021</a:t>
+              <a:t>04/10/2021</a:t>
             </a:fld>
             <a:endParaRPr lang="es-ES"/>
           </a:p>
@@ -704,7 +708,7 @@
             <a:fld id="{ABDC6CF3-9851-4DA6-B475-A3385B82C582}" type="datetimeFigureOut">
               <a:rPr lang="es-ES" smtClean="0"/>
               <a:pPr/>
-              <a:t>27/09/2021</a:t>
+              <a:t>04/10/2021</a:t>
             </a:fld>
             <a:endParaRPr lang="es-ES"/>
           </a:p>
@@ -886,7 +890,7 @@
             <a:fld id="{ABDC6CF3-9851-4DA6-B475-A3385B82C582}" type="datetimeFigureOut">
               <a:rPr lang="es-ES" smtClean="0"/>
               <a:pPr/>
-              <a:t>27/09/2021</a:t>
+              <a:t>04/10/2021</a:t>
             </a:fld>
             <a:endParaRPr lang="es-ES"/>
           </a:p>
@@ -1135,7 +1139,7 @@
             <a:fld id="{ABDC6CF3-9851-4DA6-B475-A3385B82C582}" type="datetimeFigureOut">
               <a:rPr lang="es-ES" smtClean="0"/>
               <a:pPr/>
-              <a:t>27/09/2021</a:t>
+              <a:t>04/10/2021</a:t>
             </a:fld>
             <a:endParaRPr lang="es-ES"/>
           </a:p>
@@ -1611,7 +1615,7 @@
             <a:fld id="{ABDC6CF3-9851-4DA6-B475-A3385B82C582}" type="datetimeFigureOut">
               <a:rPr lang="es-ES" smtClean="0"/>
               <a:pPr/>
-              <a:t>27/09/2021</a:t>
+              <a:t>04/10/2021</a:t>
             </a:fld>
             <a:endParaRPr lang="es-ES"/>
           </a:p>
@@ -2028,7 +2032,7 @@
             <a:fld id="{ABDC6CF3-9851-4DA6-B475-A3385B82C582}" type="datetimeFigureOut">
               <a:rPr lang="es-ES" smtClean="0"/>
               <a:pPr/>
-              <a:t>27/09/2021</a:t>
+              <a:t>04/10/2021</a:t>
             </a:fld>
             <a:endParaRPr lang="es-ES"/>
           </a:p>
@@ -2161,7 +2165,7 @@
             <a:fld id="{ABDC6CF3-9851-4DA6-B475-A3385B82C582}" type="datetimeFigureOut">
               <a:rPr lang="es-ES" smtClean="0"/>
               <a:pPr/>
-              <a:t>27/09/2021</a:t>
+              <a:t>04/10/2021</a:t>
             </a:fld>
             <a:endParaRPr lang="es-ES"/>
           </a:p>
@@ -2258,7 +2262,7 @@
             <a:fld id="{ABDC6CF3-9851-4DA6-B475-A3385B82C582}" type="datetimeFigureOut">
               <a:rPr lang="es-ES" smtClean="0"/>
               <a:pPr/>
-              <a:t>27/09/2021</a:t>
+              <a:t>04/10/2021</a:t>
             </a:fld>
             <a:endParaRPr lang="es-ES"/>
           </a:p>
@@ -2538,7 +2542,7 @@
             <a:fld id="{ABDC6CF3-9851-4DA6-B475-A3385B82C582}" type="datetimeFigureOut">
               <a:rPr lang="es-ES" smtClean="0"/>
               <a:pPr/>
-              <a:t>27/09/2021</a:t>
+              <a:t>04/10/2021</a:t>
             </a:fld>
             <a:endParaRPr lang="es-ES"/>
           </a:p>
@@ -2792,7 +2796,7 @@
             <a:fld id="{ABDC6CF3-9851-4DA6-B475-A3385B82C582}" type="datetimeFigureOut">
               <a:rPr lang="es-ES" smtClean="0"/>
               <a:pPr/>
-              <a:t>27/09/2021</a:t>
+              <a:t>04/10/2021</a:t>
             </a:fld>
             <a:endParaRPr lang="es-ES"/>
           </a:p>
@@ -3166,7 +3170,7 @@
             <a:fld id="{ABDC6CF3-9851-4DA6-B475-A3385B82C582}" type="datetimeFigureOut">
               <a:rPr lang="es-ES" smtClean="0"/>
               <a:pPr/>
-              <a:t>27/09/2021</a:t>
+              <a:t>04/10/2021</a:t>
             </a:fld>
             <a:endParaRPr lang="es-ES"/>
           </a:p>
@@ -3667,58 +3671,270 @@
             <p:ph type="title"/>
           </p:nvPr>
         </p:nvSpPr>
-        <p:spPr/>
-        <p:txBody>
-          <a:bodyPr>
-            <a:normAutofit/>
-          </a:bodyPr>
+        <p:spPr>
+          <a:xfrm>
+            <a:off x="0" y="260648"/>
+            <a:ext cx="5482952" cy="792088"/>
+          </a:xfrm>
+        </p:spPr>
+        <p:txBody>
+          <a:bodyPr/>
           <a:lstStyle/>
           <a:p>
             <a:r>
-              <a:rPr lang="es-ES" dirty="0" err="1" smtClean="0"/>
-              <a:t>Odoo</a:t>
-            </a:r>
-            <a:r>
-              <a:rPr lang="es-ES" dirty="0" smtClean="0"/>
-              <a:t>: </a:t>
-            </a:r>
-            <a:r>
-              <a:rPr lang="es-ES" dirty="0" smtClean="0"/>
-              <a:t>desventajas</a:t>
+              <a:rPr lang="es-ES" dirty="0" smtClean="0"/>
+              <a:t>Comparativa</a:t>
             </a:r>
             <a:endParaRPr lang="es-ES" dirty="0"/>
           </a:p>
         </p:txBody>
       </p:sp>
-      <p:sp>
-        <p:nvSpPr>
-          <p:cNvPr id="3" name="2 Marcador de contenido"/>
-          <p:cNvSpPr>
-            <a:spLocks noGrp="1"/>
-          </p:cNvSpPr>
+      <p:graphicFrame>
+        <p:nvGraphicFramePr>
+          <p:cNvPr id="4" name="3 Marcador de contenido"/>
+          <p:cNvGraphicFramePr>
+            <a:graphicFrameLocks noGrp="1"/>
+          </p:cNvGraphicFramePr>
           <p:nvPr>
             <p:ph idx="1"/>
           </p:nvPr>
-        </p:nvSpPr>
-        <p:spPr/>
-        <p:txBody>
-          <a:bodyPr>
-            <a:normAutofit/>
-          </a:bodyPr>
-          <a:lstStyle/>
-          <a:p>
-            <a:r>
-              <a:rPr lang="es-ES" dirty="0" smtClean="0"/>
-              <a:t>Si necesitas muchas aplicaciones o extras terminas pagando </a:t>
-            </a:r>
-            <a:r>
-              <a:rPr lang="es-ES" dirty="0" smtClean="0"/>
-              <a:t>más.</a:t>
-            </a:r>
-            <a:endParaRPr lang="es-ES" dirty="0"/>
-          </a:p>
-        </p:txBody>
-      </p:sp>
+        </p:nvGraphicFramePr>
+        <p:xfrm>
+          <a:off x="467544" y="1124744"/>
+          <a:ext cx="8229601" cy="4508458"/>
+        </p:xfrm>
+        <a:graphic>
+          <a:graphicData uri="http://schemas.openxmlformats.org/drawingml/2006/table">
+            <a:tbl>
+              <a:tblPr firstRow="1" bandRow="1">
+                <a:tableStyleId>{5C22544A-7EE6-4342-B048-85BDC9FD1C3A}</a:tableStyleId>
+              </a:tblPr>
+              <a:tblGrid>
+                <a:gridCol w="576064"/>
+                <a:gridCol w="2448272"/>
+                <a:gridCol w="2664296"/>
+                <a:gridCol w="2540969"/>
+              </a:tblGrid>
+              <a:tr h="504056">
+                <a:tc>
+                  <a:txBody>
+                    <a:bodyPr/>
+                    <a:lstStyle/>
+                    <a:p>
+                      <a:pPr algn="ctr"/>
+                      <a:endParaRPr lang="es-ES" dirty="0"/>
+                    </a:p>
+                  </a:txBody>
+                  <a:tcPr anchor="ctr"/>
+                </a:tc>
+                <a:tc>
+                  <a:txBody>
+                    <a:bodyPr/>
+                    <a:lstStyle/>
+                    <a:p>
+                      <a:pPr algn="ctr"/>
+                      <a:r>
+                        <a:rPr lang="es-ES" dirty="0" smtClean="0"/>
+                        <a:t>Sap</a:t>
+                      </a:r>
+                      <a:endParaRPr lang="es-ES" dirty="0"/>
+                    </a:p>
+                  </a:txBody>
+                  <a:tcPr anchor="ctr"/>
+                </a:tc>
+                <a:tc>
+                  <a:txBody>
+                    <a:bodyPr/>
+                    <a:lstStyle/>
+                    <a:p>
+                      <a:pPr algn="ctr"/>
+                      <a:r>
+                        <a:rPr lang="es-ES" dirty="0" smtClean="0"/>
+                        <a:t>Odoo</a:t>
+                      </a:r>
+                      <a:endParaRPr lang="es-ES" dirty="0"/>
+                    </a:p>
+                  </a:txBody>
+                  <a:tcPr anchor="ctr"/>
+                </a:tc>
+                <a:tc>
+                  <a:txBody>
+                    <a:bodyPr/>
+                    <a:lstStyle/>
+                    <a:p>
+                      <a:pPr algn="ctr"/>
+                      <a:r>
+                        <a:rPr lang="es-ES" dirty="0" smtClean="0"/>
+                        <a:t>webERP</a:t>
+                      </a:r>
+                      <a:endParaRPr lang="es-ES" dirty="0"/>
+                    </a:p>
+                  </a:txBody>
+                  <a:tcPr anchor="ctr"/>
+                </a:tc>
+              </a:tr>
+              <a:tr h="2071231">
+                <a:tc>
+                  <a:txBody>
+                    <a:bodyPr/>
+                    <a:lstStyle/>
+                    <a:p>
+                      <a:pPr algn="ctr"/>
+                      <a:r>
+                        <a:rPr lang="es-ES" sz="1400" dirty="0" smtClean="0"/>
+                        <a:t>Actualizaciones</a:t>
+                      </a:r>
+                      <a:endParaRPr lang="es-ES" sz="1400" dirty="0"/>
+                    </a:p>
+                  </a:txBody>
+                  <a:tcPr vert="vert270" anchor="ctr"/>
+                </a:tc>
+                <a:tc>
+                  <a:txBody>
+                    <a:bodyPr/>
+                    <a:lstStyle/>
+                    <a:p>
+                      <a:pPr algn="ctr"/>
+                      <a:r>
+                        <a:rPr lang="es-ES" u="none" dirty="0" smtClean="0"/>
+                        <a:t>Soporte</a:t>
+                      </a:r>
+                      <a:r>
+                        <a:rPr lang="es-ES" dirty="0" smtClean="0"/>
+                        <a:t> y mantenimiento hasta 2027</a:t>
+                      </a:r>
+                      <a:endParaRPr lang="es-ES" dirty="0"/>
+                    </a:p>
+                  </a:txBody>
+                  <a:tcPr anchor="ctr"/>
+                </a:tc>
+                <a:tc>
+                  <a:txBody>
+                    <a:bodyPr/>
+                    <a:lstStyle/>
+                    <a:p>
+                      <a:pPr algn="ctr"/>
+                      <a:r>
+                        <a:rPr lang="es-ES" dirty="0" smtClean="0"/>
+                        <a:t>Continuamente. Tanto de la comunidad como de la versión de pago.</a:t>
+                      </a:r>
+                      <a:endParaRPr lang="es-ES" dirty="0"/>
+                    </a:p>
+                  </a:txBody>
+                  <a:tcPr anchor="ctr"/>
+                </a:tc>
+                <a:tc>
+                  <a:txBody>
+                    <a:bodyPr/>
+                    <a:lstStyle/>
+                    <a:p>
+                      <a:pPr algn="ctr"/>
+                      <a:r>
+                        <a:rPr lang="es-ES" sz="1800" dirty="0" smtClean="0"/>
+                        <a:t>Última versión del 23 de junio de 2019</a:t>
+                      </a:r>
+                      <a:endParaRPr lang="es-ES" sz="1800" dirty="0"/>
+                    </a:p>
+                  </a:txBody>
+                  <a:tcPr anchor="ctr"/>
+                </a:tc>
+              </a:tr>
+              <a:tr h="1933171">
+                <a:tc>
+                  <a:txBody>
+                    <a:bodyPr/>
+                    <a:lstStyle/>
+                    <a:p>
+                      <a:pPr algn="ctr"/>
+                      <a:r>
+                        <a:rPr lang="es-ES" sz="1400" dirty="0" smtClean="0"/>
+                        <a:t>Formación</a:t>
+                      </a:r>
+                      <a:endParaRPr lang="es-ES" sz="1400" dirty="0"/>
+                    </a:p>
+                  </a:txBody>
+                  <a:tcPr vert="vert270" anchor="ctr"/>
+                </a:tc>
+                <a:tc>
+                  <a:txBody>
+                    <a:bodyPr/>
+                    <a:lstStyle/>
+                    <a:p>
+                      <a:pPr algn="ctr"/>
+                      <a:r>
+                        <a:rPr lang="es-ES" dirty="0" smtClean="0"/>
+                        <a:t>Existen cursos oficiales de pago</a:t>
+                      </a:r>
+                      <a:endParaRPr lang="es-ES" dirty="0"/>
+                    </a:p>
+                  </a:txBody>
+                  <a:tcPr anchor="ctr"/>
+                </a:tc>
+                <a:tc>
+                  <a:txBody>
+                    <a:bodyPr/>
+                    <a:lstStyle/>
+                    <a:p>
+                      <a:pPr marL="0" marR="0" indent="0" algn="ctr" defTabSz="914400" rtl="0" eaLnBrk="1" fontAlgn="auto" latinLnBrk="0" hangingPunct="1">
+                        <a:lnSpc>
+                          <a:spcPct val="100000"/>
+                        </a:lnSpc>
+                        <a:spcBef>
+                          <a:spcPts val="0"/>
+                        </a:spcBef>
+                        <a:spcAft>
+                          <a:spcPts val="0"/>
+                        </a:spcAft>
+                        <a:buClrTx/>
+                        <a:buSzTx/>
+                        <a:buFontTx/>
+                        <a:buNone/>
+                        <a:tabLst/>
+                        <a:defRPr/>
+                      </a:pPr>
+                      <a:r>
+                        <a:rPr lang="es-ES" dirty="0" smtClean="0"/>
+                        <a:t>Tutoriales, documentación y certificaciones</a:t>
+                      </a:r>
+                    </a:p>
+                  </a:txBody>
+                  <a:tcPr anchor="ctr"/>
+                </a:tc>
+                <a:tc>
+                  <a:txBody>
+                    <a:bodyPr/>
+                    <a:lstStyle/>
+                    <a:p>
+                      <a:pPr marL="0" marR="0" indent="0" algn="ctr" defTabSz="914400" rtl="0" eaLnBrk="1" fontAlgn="auto" latinLnBrk="0" hangingPunct="1">
+                        <a:lnSpc>
+                          <a:spcPct val="100000"/>
+                        </a:lnSpc>
+                        <a:spcBef>
+                          <a:spcPts val="0"/>
+                        </a:spcBef>
+                        <a:spcAft>
+                          <a:spcPts val="0"/>
+                        </a:spcAft>
+                        <a:buClrTx/>
+                        <a:buSzTx/>
+                        <a:buFontTx/>
+                        <a:buNone/>
+                        <a:tabLst/>
+                        <a:defRPr/>
+                      </a:pPr>
+                      <a:r>
+                        <a:rPr lang="es-ES" dirty="0" smtClean="0"/>
+                        <a:t>Foros, wiki y documentación</a:t>
+                      </a:r>
+                    </a:p>
+                  </a:txBody>
+                  <a:tcPr anchor="ctr"/>
+                </a:tc>
+              </a:tr>
+            </a:tbl>
+          </a:graphicData>
+        </a:graphic>
+      </p:graphicFrame>
     </p:spTree>
   </p:cSld>
   <p:clrMapOvr>
@@ -3756,6 +3972,29 @@
         </p:nvSpPr>
         <p:spPr/>
         <p:txBody>
+          <a:bodyPr/>
+          <a:lstStyle/>
+          <a:p>
+            <a:r>
+              <a:rPr lang="es-ES" dirty="0" smtClean="0"/>
+              <a:t>Sap: ventajas</a:t>
+            </a:r>
+            <a:endParaRPr lang="es-ES" dirty="0"/>
+          </a:p>
+        </p:txBody>
+      </p:sp>
+      <p:sp>
+        <p:nvSpPr>
+          <p:cNvPr id="3" name="2 Marcador de contenido"/>
+          <p:cNvSpPr>
+            <a:spLocks noGrp="1"/>
+          </p:cNvSpPr>
+          <p:nvPr>
+            <p:ph idx="1"/>
+          </p:nvPr>
+        </p:nvSpPr>
+        <p:spPr/>
+        <p:txBody>
           <a:bodyPr>
             <a:normAutofit/>
           </a:bodyPr>
@@ -3763,33 +4002,34 @@
           <a:p>
             <a:r>
               <a:rPr lang="es-ES" dirty="0" smtClean="0"/>
-              <a:t>webERP: desventajas</a:t>
-            </a:r>
-            <a:endParaRPr lang="es-ES" dirty="0"/>
-          </a:p>
-        </p:txBody>
-      </p:sp>
-      <p:sp>
-        <p:nvSpPr>
-          <p:cNvPr id="3" name="2 Marcador de contenido"/>
-          <p:cNvSpPr>
-            <a:spLocks noGrp="1"/>
-          </p:cNvSpPr>
-          <p:nvPr>
-            <p:ph idx="1"/>
-          </p:nvPr>
-        </p:nvSpPr>
-        <p:spPr/>
-        <p:txBody>
-          <a:bodyPr>
-            <a:normAutofit/>
-          </a:bodyPr>
-          <a:lstStyle/>
-          <a:p>
-            <a:r>
-              <a:rPr lang="es-ES" dirty="0" smtClean="0"/>
-              <a:t>No te ofrecen asistencia ni ningún servicio como empresa. Simplemente te ofrecen gratuitamente el software y, eso sí, mucha documentación.</a:t>
-            </a:r>
+              <a:t>Experiencia y el conocimiento para construir e implementar un sistema de la mejor forma posible</a:t>
+            </a:r>
+          </a:p>
+          <a:p>
+            <a:r>
+              <a:rPr lang="es-ES" dirty="0" smtClean="0"/>
+              <a:t>Fácil integración</a:t>
+            </a:r>
+          </a:p>
+          <a:p>
+            <a:r>
+              <a:rPr lang="es-ES" dirty="0" smtClean="0"/>
+              <a:t>Información a tiempo real</a:t>
+            </a:r>
+          </a:p>
+          <a:p>
+            <a:r>
+              <a:rPr lang="es-ES" dirty="0" smtClean="0"/>
+              <a:t>Crea un entorno de trabajo más eficiente</a:t>
+            </a:r>
+          </a:p>
+          <a:p>
+            <a:r>
+              <a:rPr lang="es-ES" dirty="0" smtClean="0"/>
+              <a:t>Interfaz de usuario adaptable</a:t>
+            </a:r>
+          </a:p>
+          <a:p>
             <a:endParaRPr lang="es-ES" dirty="0"/>
           </a:p>
         </p:txBody>
@@ -3829,6 +4069,352 @@
             <p:ph type="title"/>
           </p:nvPr>
         </p:nvSpPr>
+        <p:spPr/>
+        <p:txBody>
+          <a:bodyPr/>
+          <a:lstStyle/>
+          <a:p>
+            <a:r>
+              <a:rPr lang="es-ES" dirty="0" smtClean="0"/>
+              <a:t>Sap: desventajas</a:t>
+            </a:r>
+            <a:endParaRPr lang="es-ES" dirty="0"/>
+          </a:p>
+        </p:txBody>
+      </p:sp>
+      <p:sp>
+        <p:nvSpPr>
+          <p:cNvPr id="3" name="2 Marcador de contenido"/>
+          <p:cNvSpPr>
+            <a:spLocks noGrp="1"/>
+          </p:cNvSpPr>
+          <p:nvPr>
+            <p:ph idx="1"/>
+          </p:nvPr>
+        </p:nvSpPr>
+        <p:spPr/>
+        <p:txBody>
+          <a:bodyPr>
+            <a:normAutofit/>
+          </a:bodyPr>
+          <a:lstStyle/>
+          <a:p>
+            <a:r>
+              <a:rPr lang="es-ES" dirty="0" smtClean="0"/>
+              <a:t>Contrato inquebrantable hasta la expiración, pudiendo no ser rentable el cambio si los costes son muy altos</a:t>
+            </a:r>
+          </a:p>
+          <a:p>
+            <a:r>
+              <a:rPr lang="es-ES" dirty="0" smtClean="0"/>
+              <a:t>Los paquetes pueden no encajar en el modelo de negocio de la empresa dada su rigidez </a:t>
+            </a:r>
+            <a:r>
+              <a:rPr lang="es-ES" dirty="0" smtClean="0">
+                <a:sym typeface="Wingdings" pitchFamily="2" charset="2"/>
+              </a:rPr>
+              <a:t></a:t>
+            </a:r>
+            <a:r>
+              <a:rPr lang="es-ES" dirty="0" smtClean="0"/>
+              <a:t> la adaptación puede ser costosa</a:t>
+            </a:r>
+          </a:p>
+          <a:p>
+            <a:r>
+              <a:rPr lang="es-ES" dirty="0" smtClean="0"/>
+              <a:t>Puede pasar mucho tiempo hasta ser rentable</a:t>
+            </a:r>
+          </a:p>
+          <a:p>
+            <a:endParaRPr lang="es-ES" dirty="0"/>
+          </a:p>
+        </p:txBody>
+      </p:sp>
+    </p:spTree>
+  </p:cSld>
+  <p:clrMapOvr>
+    <a:masterClrMapping/>
+  </p:clrMapOvr>
+</p:sld>
+</file>
+
+<file path=ppt/slides/slide13.xml><?xml version="1.0" encoding="utf-8"?>
+<p:sld xmlns:a="http://schemas.openxmlformats.org/drawingml/2006/main" xmlns:r="http://schemas.openxmlformats.org/officeDocument/2006/relationships" xmlns:p="http://schemas.openxmlformats.org/presentationml/2006/main">
+  <p:cSld>
+    <p:spTree>
+      <p:nvGrpSpPr>
+        <p:cNvPr id="1" name=""/>
+        <p:cNvGrpSpPr/>
+        <p:nvPr/>
+      </p:nvGrpSpPr>
+      <p:grpSpPr>
+        <a:xfrm>
+          <a:off x="0" y="0"/>
+          <a:ext cx="0" cy="0"/>
+          <a:chOff x="0" y="0"/>
+          <a:chExt cx="0" cy="0"/>
+        </a:xfrm>
+      </p:grpSpPr>
+      <p:sp>
+        <p:nvSpPr>
+          <p:cNvPr id="2" name="1 Título"/>
+          <p:cNvSpPr>
+            <a:spLocks noGrp="1"/>
+          </p:cNvSpPr>
+          <p:nvPr>
+            <p:ph type="title"/>
+          </p:nvPr>
+        </p:nvSpPr>
+        <p:spPr/>
+        <p:txBody>
+          <a:bodyPr/>
+          <a:lstStyle/>
+          <a:p>
+            <a:r>
+              <a:rPr lang="es-ES" dirty="0" smtClean="0"/>
+              <a:t>Odoo y webERP: ventajas</a:t>
+            </a:r>
+            <a:endParaRPr lang="es-ES" dirty="0"/>
+          </a:p>
+        </p:txBody>
+      </p:sp>
+      <p:sp>
+        <p:nvSpPr>
+          <p:cNvPr id="3" name="2 Marcador de contenido"/>
+          <p:cNvSpPr>
+            <a:spLocks noGrp="1"/>
+          </p:cNvSpPr>
+          <p:nvPr>
+            <p:ph idx="1"/>
+          </p:nvPr>
+        </p:nvSpPr>
+        <p:spPr/>
+        <p:txBody>
+          <a:bodyPr>
+            <a:normAutofit/>
+          </a:bodyPr>
+          <a:lstStyle/>
+          <a:p>
+            <a:r>
+              <a:rPr lang="es-ES" dirty="0" smtClean="0"/>
+              <a:t>Es posible crear nuevas distribuciones del software y desarrollar módulos o modificar los existentes</a:t>
+            </a:r>
+          </a:p>
+          <a:p>
+            <a:r>
+              <a:rPr lang="es-ES" dirty="0" smtClean="0"/>
+              <a:t>No se depende de una empresa específica para el mantenimiento</a:t>
+            </a:r>
+          </a:p>
+          <a:p>
+            <a:r>
+              <a:rPr lang="es-ES" dirty="0" smtClean="0"/>
+              <a:t>Información a tiempo real</a:t>
+            </a:r>
+          </a:p>
+          <a:p>
+            <a:r>
+              <a:rPr lang="es-ES" dirty="0" smtClean="0"/>
+              <a:t>Crea un entorno de trabajo más eficiente</a:t>
+            </a:r>
+          </a:p>
+          <a:p>
+            <a:r>
+              <a:rPr lang="es-ES" dirty="0" smtClean="0"/>
+              <a:t>Interfaz de usuario adaptable</a:t>
+            </a:r>
+          </a:p>
+          <a:p>
+            <a:endParaRPr lang="es-ES" dirty="0"/>
+          </a:p>
+        </p:txBody>
+      </p:sp>
+    </p:spTree>
+  </p:cSld>
+  <p:clrMapOvr>
+    <a:masterClrMapping/>
+  </p:clrMapOvr>
+</p:sld>
+</file>
+
+<file path=ppt/slides/slide14.xml><?xml version="1.0" encoding="utf-8"?>
+<p:sld xmlns:a="http://schemas.openxmlformats.org/drawingml/2006/main" xmlns:r="http://schemas.openxmlformats.org/officeDocument/2006/relationships" xmlns:p="http://schemas.openxmlformats.org/presentationml/2006/main">
+  <p:cSld>
+    <p:spTree>
+      <p:nvGrpSpPr>
+        <p:cNvPr id="1" name=""/>
+        <p:cNvGrpSpPr/>
+        <p:nvPr/>
+      </p:nvGrpSpPr>
+      <p:grpSpPr>
+        <a:xfrm>
+          <a:off x="0" y="0"/>
+          <a:ext cx="0" cy="0"/>
+          <a:chOff x="0" y="0"/>
+          <a:chExt cx="0" cy="0"/>
+        </a:xfrm>
+      </p:grpSpPr>
+      <p:sp>
+        <p:nvSpPr>
+          <p:cNvPr id="2" name="1 Título"/>
+          <p:cNvSpPr>
+            <a:spLocks noGrp="1"/>
+          </p:cNvSpPr>
+          <p:nvPr>
+            <p:ph type="title"/>
+          </p:nvPr>
+        </p:nvSpPr>
+        <p:spPr/>
+        <p:txBody>
+          <a:bodyPr>
+            <a:normAutofit/>
+          </a:bodyPr>
+          <a:lstStyle/>
+          <a:p>
+            <a:r>
+              <a:rPr lang="es-ES" dirty="0" smtClean="0"/>
+              <a:t>Odoo: desventajas</a:t>
+            </a:r>
+            <a:endParaRPr lang="es-ES" dirty="0"/>
+          </a:p>
+        </p:txBody>
+      </p:sp>
+      <p:sp>
+        <p:nvSpPr>
+          <p:cNvPr id="3" name="2 Marcador de contenido"/>
+          <p:cNvSpPr>
+            <a:spLocks noGrp="1"/>
+          </p:cNvSpPr>
+          <p:nvPr>
+            <p:ph idx="1"/>
+          </p:nvPr>
+        </p:nvSpPr>
+        <p:spPr/>
+        <p:txBody>
+          <a:bodyPr>
+            <a:normAutofit/>
+          </a:bodyPr>
+          <a:lstStyle/>
+          <a:p>
+            <a:r>
+              <a:rPr lang="es-ES" dirty="0" smtClean="0"/>
+              <a:t>Si necesitas muchas aplicaciones o extras terminas pagando más.</a:t>
+            </a:r>
+            <a:endParaRPr lang="es-ES" dirty="0"/>
+          </a:p>
+        </p:txBody>
+      </p:sp>
+    </p:spTree>
+  </p:cSld>
+  <p:clrMapOvr>
+    <a:masterClrMapping/>
+  </p:clrMapOvr>
+</p:sld>
+</file>
+
+<file path=ppt/slides/slide15.xml><?xml version="1.0" encoding="utf-8"?>
+<p:sld xmlns:a="http://schemas.openxmlformats.org/drawingml/2006/main" xmlns:r="http://schemas.openxmlformats.org/officeDocument/2006/relationships" xmlns:p="http://schemas.openxmlformats.org/presentationml/2006/main">
+  <p:cSld>
+    <p:spTree>
+      <p:nvGrpSpPr>
+        <p:cNvPr id="1" name=""/>
+        <p:cNvGrpSpPr/>
+        <p:nvPr/>
+      </p:nvGrpSpPr>
+      <p:grpSpPr>
+        <a:xfrm>
+          <a:off x="0" y="0"/>
+          <a:ext cx="0" cy="0"/>
+          <a:chOff x="0" y="0"/>
+          <a:chExt cx="0" cy="0"/>
+        </a:xfrm>
+      </p:grpSpPr>
+      <p:sp>
+        <p:nvSpPr>
+          <p:cNvPr id="2" name="1 Título"/>
+          <p:cNvSpPr>
+            <a:spLocks noGrp="1"/>
+          </p:cNvSpPr>
+          <p:nvPr>
+            <p:ph type="title"/>
+          </p:nvPr>
+        </p:nvSpPr>
+        <p:spPr/>
+        <p:txBody>
+          <a:bodyPr>
+            <a:normAutofit/>
+          </a:bodyPr>
+          <a:lstStyle/>
+          <a:p>
+            <a:r>
+              <a:rPr lang="es-ES" dirty="0" smtClean="0"/>
+              <a:t>webERP: desventajas</a:t>
+            </a:r>
+            <a:endParaRPr lang="es-ES" dirty="0"/>
+          </a:p>
+        </p:txBody>
+      </p:sp>
+      <p:sp>
+        <p:nvSpPr>
+          <p:cNvPr id="3" name="2 Marcador de contenido"/>
+          <p:cNvSpPr>
+            <a:spLocks noGrp="1"/>
+          </p:cNvSpPr>
+          <p:nvPr>
+            <p:ph idx="1"/>
+          </p:nvPr>
+        </p:nvSpPr>
+        <p:spPr/>
+        <p:txBody>
+          <a:bodyPr>
+            <a:normAutofit/>
+          </a:bodyPr>
+          <a:lstStyle/>
+          <a:p>
+            <a:r>
+              <a:rPr lang="es-ES" dirty="0" smtClean="0"/>
+              <a:t>No te ofrecen asistencia ni ningún servicio como empresa. Simplemente te ofrecen gratuitamente el software y, eso sí, mucha documentación.</a:t>
+            </a:r>
+            <a:endParaRPr lang="es-ES" dirty="0"/>
+          </a:p>
+        </p:txBody>
+      </p:sp>
+    </p:spTree>
+  </p:cSld>
+  <p:clrMapOvr>
+    <a:masterClrMapping/>
+  </p:clrMapOvr>
+</p:sld>
+</file>
+
+<file path=ppt/slides/slide16.xml><?xml version="1.0" encoding="utf-8"?>
+<p:sld xmlns:a="http://schemas.openxmlformats.org/drawingml/2006/main" xmlns:r="http://schemas.openxmlformats.org/officeDocument/2006/relationships" xmlns:p="http://schemas.openxmlformats.org/presentationml/2006/main">
+  <p:cSld>
+    <p:spTree>
+      <p:nvGrpSpPr>
+        <p:cNvPr id="1" name=""/>
+        <p:cNvGrpSpPr/>
+        <p:nvPr/>
+      </p:nvGrpSpPr>
+      <p:grpSpPr>
+        <a:xfrm>
+          <a:off x="0" y="0"/>
+          <a:ext cx="0" cy="0"/>
+          <a:chOff x="0" y="0"/>
+          <a:chExt cx="0" cy="0"/>
+        </a:xfrm>
+      </p:grpSpPr>
+      <p:sp>
+        <p:nvSpPr>
+          <p:cNvPr id="2" name="1 Título"/>
+          <p:cNvSpPr>
+            <a:spLocks noGrp="1"/>
+          </p:cNvSpPr>
+          <p:nvPr>
+            <p:ph type="title"/>
+          </p:nvPr>
+        </p:nvSpPr>
         <p:spPr>
           <a:xfrm>
             <a:off x="0" y="260648"/>
@@ -4100,11 +4686,7 @@
             </a:r>
             <a:r>
               <a:rPr lang="es-ES" dirty="0" smtClean="0"/>
-              <a:t>, </a:t>
-            </a:r>
-            <a:r>
-              <a:rPr lang="es-ES" dirty="0" smtClean="0"/>
-              <a:t>Ubuntu</a:t>
+              <a:t>, Ubuntu</a:t>
             </a:r>
           </a:p>
           <a:p>
@@ -4118,7 +4700,6 @@
               <a:rPr lang="es-ES" dirty="0" smtClean="0"/>
               <a:t>400 € / mes / módulo</a:t>
             </a:r>
-            <a:endParaRPr lang="es-ES" dirty="0" smtClean="0"/>
           </a:p>
           <a:p>
             <a:endParaRPr lang="es-ES" dirty="0" smtClean="0"/>
@@ -4163,14 +4744,19 @@
             <p:ph type="title"/>
           </p:nvPr>
         </p:nvSpPr>
-        <p:spPr/>
+        <p:spPr>
+          <a:xfrm>
+            <a:off x="457200" y="267494"/>
+            <a:ext cx="8229600" cy="1217290"/>
+          </a:xfrm>
+        </p:spPr>
         <p:txBody>
           <a:bodyPr/>
           <a:lstStyle/>
           <a:p>
             <a:r>
-              <a:rPr lang="es-ES" dirty="0" err="1" smtClean="0"/>
-              <a:t>Odoo</a:t>
+              <a:rPr lang="es-ES" dirty="0" smtClean="0"/>
+              <a:t>Sap: módulos</a:t>
             </a:r>
             <a:endParaRPr lang="es-ES" dirty="0"/>
           </a:p>
@@ -4186,7 +4772,12 @@
             <p:ph idx="1"/>
           </p:nvPr>
         </p:nvSpPr>
-        <p:spPr/>
+        <p:spPr>
+          <a:xfrm>
+            <a:off x="457200" y="1772816"/>
+            <a:ext cx="8229600" cy="4752528"/>
+          </a:xfrm>
+        </p:spPr>
         <p:txBody>
           <a:bodyPr>
             <a:normAutofit/>
@@ -4195,100 +4786,55 @@
           <a:p>
             <a:r>
               <a:rPr lang="es-ES" dirty="0" smtClean="0"/>
-              <a:t> GNU </a:t>
-            </a:r>
-            <a:r>
-              <a:rPr lang="es-ES" dirty="0" err="1" smtClean="0"/>
-              <a:t>Lesser</a:t>
-            </a:r>
-            <a:r>
-              <a:rPr lang="es-ES" dirty="0" smtClean="0"/>
-              <a:t> General </a:t>
-            </a:r>
-            <a:r>
-              <a:rPr lang="es-ES" dirty="0" err="1" smtClean="0"/>
-              <a:t>Public</a:t>
-            </a:r>
-            <a:r>
-              <a:rPr lang="es-ES" dirty="0" smtClean="0"/>
-              <a:t> </a:t>
-            </a:r>
-            <a:r>
-              <a:rPr lang="es-ES" dirty="0" err="1" smtClean="0"/>
-              <a:t>License</a:t>
-            </a:r>
-            <a:r>
-              <a:rPr lang="es-ES" dirty="0" smtClean="0"/>
-              <a:t> v3</a:t>
-            </a:r>
-          </a:p>
-          <a:p>
-            <a:pPr lvl="1"/>
-            <a:r>
-              <a:rPr lang="es-ES" dirty="0" smtClean="0"/>
-              <a:t>O sea, software libre</a:t>
-            </a:r>
-          </a:p>
-          <a:p>
-            <a:r>
-              <a:rPr lang="es-ES" dirty="0" err="1" smtClean="0"/>
-              <a:t>Python</a:t>
-            </a:r>
-            <a:r>
-              <a:rPr lang="es-ES" dirty="0" smtClean="0"/>
-              <a:t> y </a:t>
-            </a:r>
-            <a:r>
-              <a:rPr lang="es-ES" dirty="0" err="1" smtClean="0"/>
-              <a:t>JavaScript</a:t>
+              <a:t>Finanzas</a:t>
             </a:r>
             <a:endParaRPr lang="es-ES" dirty="0" smtClean="0"/>
           </a:p>
           <a:p>
             <a:r>
               <a:rPr lang="es-ES" dirty="0" smtClean="0"/>
-              <a:t>Linux, Unix-</a:t>
-            </a:r>
-            <a:r>
-              <a:rPr lang="es-ES" dirty="0" err="1" smtClean="0"/>
-              <a:t>like</a:t>
-            </a:r>
-            <a:r>
-              <a:rPr lang="es-ES" dirty="0" smtClean="0"/>
-              <a:t>, OS X, Windows, iOS, Android </a:t>
-            </a:r>
-            <a:r>
-              <a:rPr lang="es-ES" dirty="0" smtClean="0">
-                <a:sym typeface="Wingdings" pitchFamily="2" charset="2"/>
-              </a:rPr>
-              <a:t> </a:t>
-            </a:r>
-            <a:r>
-              <a:rPr lang="es-ES" dirty="0" smtClean="0">
-                <a:sym typeface="Wingdings" pitchFamily="2" charset="2"/>
-              </a:rPr>
-              <a:t>multiplataforma</a:t>
-            </a:r>
-          </a:p>
-          <a:p>
-            <a:r>
-              <a:rPr lang="es-ES" dirty="0" smtClean="0">
-                <a:sym typeface="Wingdings" pitchFamily="2" charset="2"/>
-              </a:rPr>
-              <a:t>Gratis o 6 – 48 € / mes / módulo + 10 € / usuario / mes</a:t>
-            </a:r>
-          </a:p>
-          <a:p>
-            <a:pPr lvl="1"/>
-            <a:r>
-              <a:rPr lang="es-ES" dirty="0" smtClean="0">
-                <a:sym typeface="Wingdings" pitchFamily="2" charset="2"/>
-              </a:rPr>
-              <a:t>Como máximo ~ 900 € / mes</a:t>
-            </a:r>
-            <a:endParaRPr lang="es-ES" dirty="0" smtClean="0"/>
-          </a:p>
-          <a:p>
+              <a:t>Ventas</a:t>
+            </a:r>
+          </a:p>
+          <a:p>
+            <a:r>
+              <a:rPr lang="es-ES" dirty="0" smtClean="0"/>
+              <a:t>Sitios web</a:t>
+            </a:r>
+          </a:p>
+          <a:p>
+            <a:r>
+              <a:rPr lang="es-ES" dirty="0" smtClean="0"/>
+              <a:t>Inventario </a:t>
+            </a:r>
+            <a:r>
+              <a:rPr lang="es-ES" dirty="0" smtClean="0"/>
+              <a:t>y MRP</a:t>
+            </a:r>
+          </a:p>
+          <a:p>
+            <a:r>
+              <a:rPr lang="es-ES" dirty="0" smtClean="0"/>
+              <a:t>RRHH</a:t>
+            </a:r>
+          </a:p>
+          <a:p>
+            <a:r>
+              <a:rPr lang="es-ES" dirty="0" smtClean="0"/>
+              <a:t>Marketing</a:t>
+            </a:r>
+          </a:p>
+          <a:p>
+            <a:r>
+              <a:rPr lang="es-ES" dirty="0" smtClean="0"/>
+              <a:t>Servicios</a:t>
+            </a:r>
+          </a:p>
+          <a:p>
+            <a:r>
+              <a:rPr lang="es-ES" dirty="0" smtClean="0"/>
+              <a:t>Productividad</a:t>
+            </a:r>
             <a:endParaRPr lang="es-ES" dirty="0"/>
           </a:p>
         </p:txBody>
@@ -4302,6 +4848,165 @@
 </file>
 
 <file path=ppt/slides/slide5.xml><?xml version="1.0" encoding="utf-8"?>
+<p:sld xmlns:a="http://schemas.openxmlformats.org/drawingml/2006/main" xmlns:r="http://schemas.openxmlformats.org/officeDocument/2006/relationships" xmlns:p="http://schemas.openxmlformats.org/presentationml/2006/main">
+  <p:cSld>
+    <p:spTree>
+      <p:nvGrpSpPr>
+        <p:cNvPr id="1" name=""/>
+        <p:cNvGrpSpPr/>
+        <p:nvPr/>
+      </p:nvGrpSpPr>
+      <p:grpSpPr>
+        <a:xfrm>
+          <a:off x="0" y="0"/>
+          <a:ext cx="0" cy="0"/>
+          <a:chOff x="0" y="0"/>
+          <a:chExt cx="0" cy="0"/>
+        </a:xfrm>
+      </p:grpSpPr>
+      <p:sp>
+        <p:nvSpPr>
+          <p:cNvPr id="2" name="1 Título"/>
+          <p:cNvSpPr>
+            <a:spLocks noGrp="1"/>
+          </p:cNvSpPr>
+          <p:nvPr>
+            <p:ph type="title"/>
+          </p:nvPr>
+        </p:nvSpPr>
+        <p:spPr/>
+        <p:txBody>
+          <a:bodyPr/>
+          <a:lstStyle/>
+          <a:p>
+            <a:r>
+              <a:rPr lang="es-ES" dirty="0" smtClean="0"/>
+              <a:t>Odoo</a:t>
+            </a:r>
+            <a:endParaRPr lang="es-ES" dirty="0"/>
+          </a:p>
+        </p:txBody>
+      </p:sp>
+      <p:sp>
+        <p:nvSpPr>
+          <p:cNvPr id="3" name="2 Marcador de contenido"/>
+          <p:cNvSpPr>
+            <a:spLocks noGrp="1"/>
+          </p:cNvSpPr>
+          <p:nvPr>
+            <p:ph idx="1"/>
+          </p:nvPr>
+        </p:nvSpPr>
+        <p:spPr/>
+        <p:txBody>
+          <a:bodyPr>
+            <a:normAutofit/>
+          </a:bodyPr>
+          <a:lstStyle/>
+          <a:p>
+            <a:r>
+              <a:rPr lang="es-ES" dirty="0" smtClean="0"/>
+              <a:t> GNU </a:t>
+            </a:r>
+            <a:r>
+              <a:rPr lang="es-ES" dirty="0" err="1" smtClean="0"/>
+              <a:t>Lesser</a:t>
+            </a:r>
+            <a:r>
+              <a:rPr lang="es-ES" dirty="0" smtClean="0"/>
+              <a:t> General </a:t>
+            </a:r>
+            <a:r>
+              <a:rPr lang="es-ES" dirty="0" err="1" smtClean="0"/>
+              <a:t>Public</a:t>
+            </a:r>
+            <a:r>
+              <a:rPr lang="es-ES" dirty="0" smtClean="0"/>
+              <a:t> </a:t>
+            </a:r>
+            <a:r>
+              <a:rPr lang="es-ES" dirty="0" err="1" smtClean="0"/>
+              <a:t>License</a:t>
+            </a:r>
+            <a:r>
+              <a:rPr lang="es-ES" dirty="0" smtClean="0"/>
+              <a:t> v3</a:t>
+            </a:r>
+          </a:p>
+          <a:p>
+            <a:pPr lvl="1"/>
+            <a:r>
+              <a:rPr lang="es-ES" dirty="0" smtClean="0"/>
+              <a:t>O sea, software libre</a:t>
+            </a:r>
+          </a:p>
+          <a:p>
+            <a:r>
+              <a:rPr lang="es-ES" dirty="0" err="1" smtClean="0"/>
+              <a:t>Python</a:t>
+            </a:r>
+            <a:r>
+              <a:rPr lang="es-ES" dirty="0" smtClean="0"/>
+              <a:t> y </a:t>
+            </a:r>
+            <a:r>
+              <a:rPr lang="es-ES" dirty="0" err="1" smtClean="0"/>
+              <a:t>JavaScript</a:t>
+            </a:r>
+            <a:endParaRPr lang="es-ES" dirty="0" smtClean="0"/>
+          </a:p>
+          <a:p>
+            <a:r>
+              <a:rPr lang="es-ES" dirty="0" smtClean="0"/>
+              <a:t>Linux, Unix-</a:t>
+            </a:r>
+            <a:r>
+              <a:rPr lang="es-ES" dirty="0" err="1" smtClean="0"/>
+              <a:t>like</a:t>
+            </a:r>
+            <a:r>
+              <a:rPr lang="es-ES" dirty="0" smtClean="0"/>
+              <a:t>, OS X, Windows, iOS, Android </a:t>
+            </a:r>
+            <a:r>
+              <a:rPr lang="es-ES" dirty="0" smtClean="0">
+                <a:sym typeface="Wingdings" pitchFamily="2" charset="2"/>
+              </a:rPr>
+              <a:t> multiplataforma</a:t>
+            </a:r>
+          </a:p>
+          <a:p>
+            <a:r>
+              <a:rPr lang="es-ES" dirty="0" smtClean="0">
+                <a:sym typeface="Wingdings" pitchFamily="2" charset="2"/>
+              </a:rPr>
+              <a:t>Gratis o 6 – 48 € / mes / módulo + 10 € / usuario / mes</a:t>
+            </a:r>
+          </a:p>
+          <a:p>
+            <a:pPr lvl="1"/>
+            <a:r>
+              <a:rPr lang="es-ES" dirty="0" smtClean="0">
+                <a:sym typeface="Wingdings" pitchFamily="2" charset="2"/>
+              </a:rPr>
+              <a:t>Como máximo ~ 900 € / mes</a:t>
+            </a:r>
+            <a:endParaRPr lang="es-ES" dirty="0" smtClean="0"/>
+          </a:p>
+          <a:p>
+            <a:endParaRPr lang="es-ES" dirty="0"/>
+          </a:p>
+        </p:txBody>
+      </p:sp>
+    </p:spTree>
+  </p:cSld>
+  <p:clrMapOvr>
+    <a:masterClrMapping/>
+  </p:clrMapOvr>
+</p:sld>
+</file>
+
+<file path=ppt/slides/slide6.xml><?xml version="1.0" encoding="utf-8"?>
 <p:sld xmlns:a="http://schemas.openxmlformats.org/drawingml/2006/main" xmlns:r="http://schemas.openxmlformats.org/officeDocument/2006/relationships" xmlns:p="http://schemas.openxmlformats.org/presentationml/2006/main">
   <p:cSld>
     <p:spTree>
@@ -4372,133 +5077,9 @@
           <a:lstStyle/>
           <a:p>
             <a:r>
-              <a:rPr lang="es-ES" dirty="0" err="1" smtClean="0"/>
+              <a:rPr lang="es-ES" dirty="0" smtClean="0"/>
               <a:t>Odoo</a:t>
             </a:r>
-            <a:endParaRPr lang="es-ES" dirty="0"/>
-          </a:p>
-        </p:txBody>
-      </p:sp>
-    </p:spTree>
-  </p:cSld>
-  <p:clrMapOvr>
-    <a:masterClrMapping/>
-  </p:clrMapOvr>
-</p:sld>
-</file>
-
-<file path=ppt/slides/slide6.xml><?xml version="1.0" encoding="utf-8"?>
-<p:sld xmlns:a="http://schemas.openxmlformats.org/drawingml/2006/main" xmlns:r="http://schemas.openxmlformats.org/officeDocument/2006/relationships" xmlns:p="http://schemas.openxmlformats.org/presentationml/2006/main">
-  <p:cSld>
-    <p:spTree>
-      <p:nvGrpSpPr>
-        <p:cNvPr id="1" name=""/>
-        <p:cNvGrpSpPr/>
-        <p:nvPr/>
-      </p:nvGrpSpPr>
-      <p:grpSpPr>
-        <a:xfrm>
-          <a:off x="0" y="0"/>
-          <a:ext cx="0" cy="0"/>
-          <a:chOff x="0" y="0"/>
-          <a:chExt cx="0" cy="0"/>
-        </a:xfrm>
-      </p:grpSpPr>
-      <p:sp>
-        <p:nvSpPr>
-          <p:cNvPr id="2" name="1 Título"/>
-          <p:cNvSpPr>
-            <a:spLocks noGrp="1"/>
-          </p:cNvSpPr>
-          <p:nvPr>
-            <p:ph type="title"/>
-          </p:nvPr>
-        </p:nvSpPr>
-        <p:spPr/>
-        <p:txBody>
-          <a:bodyPr/>
-          <a:lstStyle/>
-          <a:p>
-            <a:r>
-              <a:rPr lang="es-ES" dirty="0" smtClean="0"/>
-              <a:t>webERP</a:t>
-            </a:r>
-            <a:endParaRPr lang="es-ES" dirty="0"/>
-          </a:p>
-        </p:txBody>
-      </p:sp>
-      <p:sp>
-        <p:nvSpPr>
-          <p:cNvPr id="3" name="2 Marcador de contenido"/>
-          <p:cNvSpPr>
-            <a:spLocks noGrp="1"/>
-          </p:cNvSpPr>
-          <p:nvPr>
-            <p:ph idx="1"/>
-          </p:nvPr>
-        </p:nvSpPr>
-        <p:spPr/>
-        <p:txBody>
-          <a:bodyPr>
-            <a:normAutofit/>
-          </a:bodyPr>
-          <a:lstStyle/>
-          <a:p>
-            <a:r>
-              <a:rPr lang="es-ES" dirty="0" smtClean="0"/>
-              <a:t> GNU General </a:t>
-            </a:r>
-            <a:r>
-              <a:rPr lang="es-ES" dirty="0" err="1" smtClean="0"/>
-              <a:t>Public</a:t>
-            </a:r>
-            <a:r>
-              <a:rPr lang="es-ES" dirty="0" smtClean="0"/>
-              <a:t> </a:t>
-            </a:r>
-            <a:r>
-              <a:rPr lang="es-ES" dirty="0" err="1" smtClean="0"/>
-              <a:t>License</a:t>
-            </a:r>
-            <a:endParaRPr lang="es-ES" dirty="0" smtClean="0"/>
-          </a:p>
-          <a:p>
-            <a:pPr lvl="1"/>
-            <a:r>
-              <a:rPr lang="es-ES" dirty="0" smtClean="0"/>
-              <a:t>O sea, también software libre</a:t>
-            </a:r>
-          </a:p>
-          <a:p>
-            <a:r>
-              <a:rPr lang="es-ES" dirty="0" smtClean="0"/>
-              <a:t>PHP</a:t>
-            </a:r>
-          </a:p>
-          <a:p>
-            <a:r>
-              <a:rPr lang="es-ES" dirty="0" smtClean="0">
-                <a:sym typeface="Wingdings" pitchFamily="2" charset="2"/>
-              </a:rPr>
-              <a:t>Multiplataforma ya que es </a:t>
-            </a:r>
-            <a:r>
-              <a:rPr lang="es-ES" dirty="0" smtClean="0">
-                <a:sym typeface="Wingdings" pitchFamily="2" charset="2"/>
-              </a:rPr>
-              <a:t>web</a:t>
-            </a:r>
-          </a:p>
-          <a:p>
-            <a:r>
-              <a:rPr lang="es-ES" dirty="0" smtClean="0">
-                <a:sym typeface="Wingdings" pitchFamily="2" charset="2"/>
-              </a:rPr>
-              <a:t>Completamente gratuito</a:t>
-            </a:r>
-            <a:endParaRPr lang="es-ES" dirty="0" smtClean="0"/>
-          </a:p>
-          <a:p>
             <a:endParaRPr lang="es-ES" dirty="0"/>
           </a:p>
         </p:txBody>
@@ -4545,7 +5126,7 @@
           <a:p>
             <a:r>
               <a:rPr lang="es-ES" dirty="0" smtClean="0"/>
-              <a:t>Sap: ventajas</a:t>
+              <a:t>webERP</a:t>
             </a:r>
             <a:endParaRPr lang="es-ES" dirty="0"/>
           </a:p>
@@ -4570,32 +5151,51 @@
           <a:p>
             <a:r>
               <a:rPr lang="es-ES" dirty="0" smtClean="0"/>
-              <a:t>Experiencia y el conocimiento para construir e implementar un sistema de la mejor forma posible</a:t>
-            </a:r>
-          </a:p>
-          <a:p>
-            <a:r>
-              <a:rPr lang="es-ES" dirty="0" smtClean="0"/>
-              <a:t>Fácil integración</a:t>
-            </a:r>
-          </a:p>
-          <a:p>
-            <a:r>
-              <a:rPr lang="es-ES" dirty="0" smtClean="0"/>
-              <a:t>Información a tiempo real</a:t>
-            </a:r>
-          </a:p>
-          <a:p>
-            <a:r>
-              <a:rPr lang="es-ES" dirty="0" smtClean="0"/>
-              <a:t>Crea un entorno de trabajo más eficiente</a:t>
-            </a:r>
-          </a:p>
-          <a:p>
-            <a:r>
-              <a:rPr lang="es-ES" dirty="0" smtClean="0"/>
-              <a:t>Interfaz de usuario adaptable</a:t>
-            </a:r>
+              <a:t> GNU General </a:t>
+            </a:r>
+            <a:r>
+              <a:rPr lang="es-ES" dirty="0" err="1" smtClean="0"/>
+              <a:t>Public</a:t>
+            </a:r>
+            <a:r>
+              <a:rPr lang="es-ES" dirty="0" smtClean="0"/>
+              <a:t> </a:t>
+            </a:r>
+            <a:r>
+              <a:rPr lang="es-ES" dirty="0" err="1" smtClean="0"/>
+              <a:t>License</a:t>
+            </a:r>
+            <a:endParaRPr lang="es-ES" dirty="0" smtClean="0"/>
+          </a:p>
+          <a:p>
+            <a:pPr lvl="1"/>
+            <a:r>
+              <a:rPr lang="es-ES" dirty="0" smtClean="0"/>
+              <a:t>O sea, también software libre</a:t>
+            </a:r>
+          </a:p>
+          <a:p>
+            <a:r>
+              <a:rPr lang="es-ES" dirty="0" smtClean="0"/>
+              <a:t>PHP</a:t>
+            </a:r>
+          </a:p>
+          <a:p>
+            <a:r>
+              <a:rPr lang="es-ES" dirty="0" smtClean="0">
+                <a:sym typeface="Wingdings" pitchFamily="2" charset="2"/>
+              </a:rPr>
+              <a:t>Multiplataforma ya que es web</a:t>
+            </a:r>
+          </a:p>
+          <a:p>
+            <a:r>
+              <a:rPr lang="es-ES" dirty="0" smtClean="0">
+                <a:sym typeface="Wingdings" pitchFamily="2" charset="2"/>
+              </a:rPr>
+              <a:t>Completamente gratuito</a:t>
+            </a:r>
+            <a:endParaRPr lang="es-ES" dirty="0" smtClean="0"/>
           </a:p>
           <a:p>
             <a:endParaRPr lang="es-ES" dirty="0"/>
@@ -4637,68 +5237,548 @@
             <p:ph type="title"/>
           </p:nvPr>
         </p:nvSpPr>
-        <p:spPr/>
+        <p:spPr>
+          <a:xfrm>
+            <a:off x="0" y="260648"/>
+            <a:ext cx="5482952" cy="792088"/>
+          </a:xfrm>
+        </p:spPr>
         <p:txBody>
           <a:bodyPr/>
           <a:lstStyle/>
           <a:p>
             <a:r>
               <a:rPr lang="es-ES" dirty="0" smtClean="0"/>
-              <a:t>Sap: desventajas</a:t>
+              <a:t>Comparativa</a:t>
             </a:r>
             <a:endParaRPr lang="es-ES" dirty="0"/>
           </a:p>
         </p:txBody>
       </p:sp>
-      <p:sp>
-        <p:nvSpPr>
-          <p:cNvPr id="3" name="2 Marcador de contenido"/>
-          <p:cNvSpPr>
-            <a:spLocks noGrp="1"/>
-          </p:cNvSpPr>
+      <p:graphicFrame>
+        <p:nvGraphicFramePr>
+          <p:cNvPr id="4" name="3 Marcador de contenido"/>
+          <p:cNvGraphicFramePr>
+            <a:graphicFrameLocks noGrp="1"/>
+          </p:cNvGraphicFramePr>
           <p:nvPr>
             <p:ph idx="1"/>
           </p:nvPr>
-        </p:nvSpPr>
-        <p:spPr/>
-        <p:txBody>
-          <a:bodyPr>
-            <a:normAutofit/>
-          </a:bodyPr>
-          <a:lstStyle/>
-          <a:p>
-            <a:r>
-              <a:rPr lang="es-ES" dirty="0" smtClean="0"/>
-              <a:t>Contrato inquebrantable hasta la expiración, pudiendo no ser rentable el cambio si los costes son muy altos</a:t>
-            </a:r>
-          </a:p>
-          <a:p>
-            <a:r>
-              <a:rPr lang="es-ES" dirty="0" smtClean="0"/>
-              <a:t>Los paquetes pueden no encajar en el modelo de negocio de la empresa dada su rigidez </a:t>
-            </a:r>
-            <a:r>
-              <a:rPr lang="es-ES" dirty="0" smtClean="0">
-                <a:sym typeface="Wingdings" pitchFamily="2" charset="2"/>
-              </a:rPr>
-              <a:t></a:t>
-            </a:r>
-            <a:r>
-              <a:rPr lang="es-ES" dirty="0" smtClean="0"/>
-              <a:t> la adaptación puede ser costosa</a:t>
-            </a:r>
-          </a:p>
-          <a:p>
-            <a:r>
-              <a:rPr lang="es-ES" dirty="0" smtClean="0"/>
-              <a:t>Puede pasar mucho tiempo hasta ser rentable</a:t>
-            </a:r>
-          </a:p>
-          <a:p>
-            <a:endParaRPr lang="es-ES" dirty="0"/>
-          </a:p>
-        </p:txBody>
-      </p:sp>
+        </p:nvGraphicFramePr>
+        <p:xfrm>
+          <a:off x="467544" y="1196752"/>
+          <a:ext cx="8229601" cy="5340045"/>
+        </p:xfrm>
+        <a:graphic>
+          <a:graphicData uri="http://schemas.openxmlformats.org/drawingml/2006/table">
+            <a:tbl>
+              <a:tblPr firstRow="1" bandRow="1">
+                <a:tableStyleId>{5C22544A-7EE6-4342-B048-85BDC9FD1C3A}</a:tableStyleId>
+              </a:tblPr>
+              <a:tblGrid>
+                <a:gridCol w="576064"/>
+                <a:gridCol w="2448272"/>
+                <a:gridCol w="2664296"/>
+                <a:gridCol w="2540969"/>
+              </a:tblGrid>
+              <a:tr h="507246">
+                <a:tc>
+                  <a:txBody>
+                    <a:bodyPr/>
+                    <a:lstStyle/>
+                    <a:p>
+                      <a:pPr algn="ctr"/>
+                      <a:endParaRPr lang="es-ES" dirty="0"/>
+                    </a:p>
+                  </a:txBody>
+                  <a:tcPr anchor="ctr"/>
+                </a:tc>
+                <a:tc>
+                  <a:txBody>
+                    <a:bodyPr/>
+                    <a:lstStyle/>
+                    <a:p>
+                      <a:pPr algn="ctr"/>
+                      <a:r>
+                        <a:rPr lang="es-ES" dirty="0" smtClean="0"/>
+                        <a:t>Sap</a:t>
+                      </a:r>
+                      <a:endParaRPr lang="es-ES" dirty="0"/>
+                    </a:p>
+                  </a:txBody>
+                  <a:tcPr anchor="ctr"/>
+                </a:tc>
+                <a:tc>
+                  <a:txBody>
+                    <a:bodyPr/>
+                    <a:lstStyle/>
+                    <a:p>
+                      <a:pPr algn="ctr"/>
+                      <a:r>
+                        <a:rPr lang="es-ES" dirty="0" smtClean="0"/>
+                        <a:t>Odoo</a:t>
+                      </a:r>
+                      <a:endParaRPr lang="es-ES" dirty="0"/>
+                    </a:p>
+                  </a:txBody>
+                  <a:tcPr anchor="ctr"/>
+                </a:tc>
+                <a:tc>
+                  <a:txBody>
+                    <a:bodyPr/>
+                    <a:lstStyle/>
+                    <a:p>
+                      <a:pPr algn="ctr"/>
+                      <a:r>
+                        <a:rPr lang="es-ES" dirty="0" smtClean="0"/>
+                        <a:t>webERP</a:t>
+                      </a:r>
+                      <a:endParaRPr lang="es-ES" dirty="0"/>
+                    </a:p>
+                  </a:txBody>
+                  <a:tcPr anchor="ctr"/>
+                </a:tc>
+              </a:tr>
+              <a:tr h="2445082">
+                <a:tc>
+                  <a:txBody>
+                    <a:bodyPr/>
+                    <a:lstStyle/>
+                    <a:p>
+                      <a:pPr algn="ctr"/>
+                      <a:r>
+                        <a:rPr lang="es-ES" sz="1400" dirty="0" smtClean="0"/>
+                        <a:t>Módulos</a:t>
+                      </a:r>
+                      <a:endParaRPr lang="es-ES" sz="1400" dirty="0"/>
+                    </a:p>
+                  </a:txBody>
+                  <a:tcPr vert="vert270" anchor="ctr"/>
+                </a:tc>
+                <a:tc>
+                  <a:txBody>
+                    <a:bodyPr/>
+                    <a:lstStyle/>
+                    <a:p>
+                      <a:pPr algn="ctr"/>
+                      <a:r>
+                        <a:rPr lang="es-ES" dirty="0" smtClean="0"/>
+                        <a:t>Finanzas</a:t>
+                      </a:r>
+                    </a:p>
+                    <a:p>
+                      <a:pPr algn="ctr"/>
+                      <a:r>
+                        <a:rPr lang="es-ES" dirty="0" smtClean="0"/>
+                        <a:t>Ventas</a:t>
+                      </a:r>
+                    </a:p>
+                    <a:p>
+                      <a:pPr algn="ctr"/>
+                      <a:r>
+                        <a:rPr lang="es-ES" dirty="0" smtClean="0"/>
+                        <a:t>Sitios web</a:t>
+                      </a:r>
+                    </a:p>
+                    <a:p>
+                      <a:pPr algn="ctr"/>
+                      <a:r>
+                        <a:rPr lang="es-ES" dirty="0" smtClean="0"/>
+                        <a:t>Inventario y MRP</a:t>
+                      </a:r>
+                    </a:p>
+                    <a:p>
+                      <a:pPr algn="ctr"/>
+                      <a:r>
+                        <a:rPr lang="es-ES" dirty="0" smtClean="0"/>
+                        <a:t>RRHH</a:t>
+                      </a:r>
+                    </a:p>
+                    <a:p>
+                      <a:pPr algn="ctr"/>
+                      <a:r>
+                        <a:rPr lang="es-ES" dirty="0" smtClean="0"/>
+                        <a:t>Marketing</a:t>
+                      </a:r>
+                    </a:p>
+                    <a:p>
+                      <a:pPr algn="ctr"/>
+                      <a:r>
+                        <a:rPr lang="es-ES" dirty="0" smtClean="0"/>
+                        <a:t>Servicios</a:t>
+                      </a:r>
+                    </a:p>
+                    <a:p>
+                      <a:pPr algn="ctr"/>
+                      <a:r>
+                        <a:rPr lang="es-ES" dirty="0" smtClean="0"/>
+                        <a:t>Productividad</a:t>
+                      </a:r>
+                      <a:endParaRPr lang="es-ES" dirty="0"/>
+                    </a:p>
+                  </a:txBody>
+                  <a:tcPr anchor="ctr"/>
+                </a:tc>
+                <a:tc>
+                  <a:txBody>
+                    <a:bodyPr/>
+                    <a:lstStyle/>
+                    <a:p>
+                      <a:pPr algn="ctr"/>
+                      <a:r>
+                        <a:rPr lang="es-ES" dirty="0" smtClean="0"/>
+                        <a:t>Finanzas</a:t>
+                      </a:r>
+                    </a:p>
+                    <a:p>
+                      <a:pPr algn="ctr"/>
+                      <a:r>
+                        <a:rPr lang="es-ES" dirty="0" smtClean="0"/>
+                        <a:t>Ventas</a:t>
+                      </a:r>
+                    </a:p>
+                    <a:p>
+                      <a:pPr algn="ctr"/>
+                      <a:r>
+                        <a:rPr lang="es-ES" dirty="0" smtClean="0"/>
+                        <a:t>Sitios web</a:t>
+                      </a:r>
+                    </a:p>
+                    <a:p>
+                      <a:pPr algn="ctr"/>
+                      <a:r>
+                        <a:rPr lang="es-ES" dirty="0" smtClean="0"/>
+                        <a:t>Inventario y MRP</a:t>
+                      </a:r>
+                    </a:p>
+                    <a:p>
+                      <a:pPr algn="ctr"/>
+                      <a:r>
+                        <a:rPr lang="es-ES" dirty="0" smtClean="0"/>
+                        <a:t>RRHH</a:t>
+                      </a:r>
+                    </a:p>
+                    <a:p>
+                      <a:pPr algn="ctr"/>
+                      <a:r>
+                        <a:rPr lang="es-ES" dirty="0" smtClean="0"/>
+                        <a:t>Marketing</a:t>
+                      </a:r>
+                    </a:p>
+                    <a:p>
+                      <a:pPr algn="ctr"/>
+                      <a:r>
+                        <a:rPr lang="es-ES" dirty="0" smtClean="0"/>
+                        <a:t>Servicios</a:t>
+                      </a:r>
+                    </a:p>
+                    <a:p>
+                      <a:pPr algn="ctr"/>
+                      <a:r>
+                        <a:rPr lang="es-ES" dirty="0" smtClean="0"/>
+                        <a:t>Productividad</a:t>
+                      </a:r>
+                      <a:endParaRPr lang="es-ES" dirty="0"/>
+                    </a:p>
+                  </a:txBody>
+                  <a:tcPr anchor="ctr"/>
+                </a:tc>
+                <a:tc>
+                  <a:txBody>
+                    <a:bodyPr/>
+                    <a:lstStyle/>
+                    <a:p>
+                      <a:pPr algn="ctr"/>
+                      <a:r>
+                        <a:rPr lang="es-ES" sz="1200" dirty="0" smtClean="0"/>
+                        <a:t>Seguridad</a:t>
+                      </a:r>
+                    </a:p>
+                    <a:p>
+                      <a:pPr algn="ctr"/>
+                      <a:r>
+                        <a:rPr lang="es-ES" sz="1200" dirty="0" smtClean="0"/>
+                        <a:t>Ventas y pedidos</a:t>
+                      </a:r>
+                    </a:p>
+                    <a:p>
+                      <a:pPr algn="ctr"/>
+                      <a:r>
+                        <a:rPr lang="es-ES" sz="1200" dirty="0" smtClean="0"/>
+                        <a:t>Impuestos</a:t>
+                      </a:r>
+                    </a:p>
+                    <a:p>
+                      <a:pPr algn="ctr"/>
+                      <a:r>
+                        <a:rPr lang="es-ES" sz="1200" dirty="0" smtClean="0"/>
+                        <a:t>Cuentas por cobrar</a:t>
+                      </a:r>
+                    </a:p>
+                    <a:p>
+                      <a:pPr algn="ctr"/>
+                      <a:r>
+                        <a:rPr lang="es-ES" sz="1200" dirty="0" smtClean="0"/>
+                        <a:t>Cuentas por pagar</a:t>
+                      </a:r>
+                    </a:p>
+                    <a:p>
+                      <a:pPr algn="ctr"/>
+                      <a:r>
+                        <a:rPr lang="es-ES" sz="1200" dirty="0" smtClean="0"/>
+                        <a:t>Inventarlo</a:t>
+                      </a:r>
+                    </a:p>
+                    <a:p>
+                      <a:pPr algn="ctr"/>
+                      <a:r>
+                        <a:rPr lang="es-ES" sz="1200" dirty="0" smtClean="0"/>
+                        <a:t>Compras</a:t>
+                      </a:r>
+                    </a:p>
+                    <a:p>
+                      <a:pPr algn="ctr"/>
+                      <a:r>
+                        <a:rPr lang="es-ES" sz="1200" dirty="0" smtClean="0"/>
+                        <a:t>Banco</a:t>
+                      </a:r>
+                    </a:p>
+                    <a:p>
+                      <a:pPr algn="ctr"/>
+                      <a:r>
+                        <a:rPr lang="es-ES" sz="1200" dirty="0" smtClean="0"/>
+                        <a:t>Libro mayor</a:t>
+                      </a:r>
+                    </a:p>
+                    <a:p>
+                      <a:pPr algn="ctr"/>
+                      <a:r>
+                        <a:rPr lang="es-ES" sz="1200" dirty="0" smtClean="0"/>
+                        <a:t>Fabricación</a:t>
+                      </a:r>
+                    </a:p>
+                    <a:p>
+                      <a:pPr algn="ctr"/>
+                      <a:r>
+                        <a:rPr lang="es-ES" sz="1200" dirty="0" smtClean="0"/>
+                        <a:t>Contratación</a:t>
+                      </a:r>
+                    </a:p>
+                    <a:p>
+                      <a:pPr algn="ctr"/>
+                      <a:r>
+                        <a:rPr lang="es-ES" sz="1200" dirty="0" smtClean="0"/>
+                        <a:t>Activos fijos</a:t>
+                      </a:r>
+                    </a:p>
+                  </a:txBody>
+                  <a:tcPr anchor="ctr"/>
+                </a:tc>
+              </a:tr>
+              <a:tr h="1175196">
+                <a:tc>
+                  <a:txBody>
+                    <a:bodyPr/>
+                    <a:lstStyle/>
+                    <a:p>
+                      <a:pPr algn="ctr"/>
+                      <a:r>
+                        <a:rPr lang="es-ES" sz="1400" dirty="0" smtClean="0"/>
+                        <a:t>Instalación</a:t>
+                      </a:r>
+                      <a:endParaRPr lang="es-ES" sz="1400" dirty="0"/>
+                    </a:p>
+                  </a:txBody>
+                  <a:tcPr vert="vert270" anchor="ctr"/>
+                </a:tc>
+                <a:tc>
+                  <a:txBody>
+                    <a:bodyPr/>
+                    <a:lstStyle/>
+                    <a:p>
+                      <a:pPr algn="ctr"/>
+                      <a:r>
+                        <a:rPr lang="es-ES" dirty="0" smtClean="0"/>
+                        <a:t>Cloud</a:t>
+                      </a:r>
+                      <a:endParaRPr lang="es-ES" dirty="0"/>
+                    </a:p>
+                  </a:txBody>
+                  <a:tcPr anchor="ctr"/>
+                </a:tc>
+                <a:tc>
+                  <a:txBody>
+                    <a:bodyPr/>
+                    <a:lstStyle/>
+                    <a:p>
+                      <a:pPr marL="0" marR="0" indent="0" algn="ctr" defTabSz="914400" rtl="0" eaLnBrk="1" fontAlgn="auto" latinLnBrk="0" hangingPunct="1">
+                        <a:lnSpc>
+                          <a:spcPct val="100000"/>
+                        </a:lnSpc>
+                        <a:spcBef>
+                          <a:spcPts val="0"/>
+                        </a:spcBef>
+                        <a:spcAft>
+                          <a:spcPts val="0"/>
+                        </a:spcAft>
+                        <a:buClrTx/>
+                        <a:buSzTx/>
+                        <a:buFontTx/>
+                        <a:buNone/>
+                        <a:tabLst/>
+                        <a:defRPr/>
+                      </a:pPr>
+                      <a:r>
+                        <a:rPr lang="es-ES" dirty="0" smtClean="0"/>
+                        <a:t>Cloud</a:t>
+                      </a:r>
+                      <a:r>
+                        <a:rPr lang="es-ES" baseline="0" dirty="0" smtClean="0"/>
+                        <a:t> y servidores propios</a:t>
+                      </a:r>
+                      <a:endParaRPr lang="es-ES" dirty="0" smtClean="0"/>
+                    </a:p>
+                  </a:txBody>
+                  <a:tcPr anchor="ctr"/>
+                </a:tc>
+                <a:tc>
+                  <a:txBody>
+                    <a:bodyPr/>
+                    <a:lstStyle/>
+                    <a:p>
+                      <a:pPr marL="0" marR="0" indent="0" algn="ctr" defTabSz="914400" rtl="0" eaLnBrk="1" fontAlgn="auto" latinLnBrk="0" hangingPunct="1">
+                        <a:lnSpc>
+                          <a:spcPct val="100000"/>
+                        </a:lnSpc>
+                        <a:spcBef>
+                          <a:spcPts val="0"/>
+                        </a:spcBef>
+                        <a:spcAft>
+                          <a:spcPts val="0"/>
+                        </a:spcAft>
+                        <a:buClrTx/>
+                        <a:buSzTx/>
+                        <a:buFontTx/>
+                        <a:buNone/>
+                        <a:tabLst/>
+                        <a:defRPr/>
+                      </a:pPr>
+                      <a:r>
+                        <a:rPr lang="es-ES" dirty="0" smtClean="0"/>
+                        <a:t>Cloud</a:t>
+                      </a:r>
+                      <a:r>
+                        <a:rPr lang="es-ES" baseline="0" dirty="0" smtClean="0"/>
+                        <a:t> y servidores propios</a:t>
+                      </a:r>
+                      <a:endParaRPr lang="es-ES" dirty="0" smtClean="0"/>
+                    </a:p>
+                  </a:txBody>
+                  <a:tcPr anchor="ctr"/>
+                </a:tc>
+              </a:tr>
+              <a:tr h="1212521">
+                <a:tc>
+                  <a:txBody>
+                    <a:bodyPr/>
+                    <a:lstStyle/>
+                    <a:p>
+                      <a:pPr algn="ctr"/>
+                      <a:r>
+                        <a:rPr lang="es-ES" sz="1400" dirty="0" smtClean="0"/>
+                        <a:t>Movilidad</a:t>
+                      </a:r>
+                      <a:endParaRPr lang="es-ES" sz="1400" dirty="0"/>
+                    </a:p>
+                  </a:txBody>
+                  <a:tcPr vert="vert270" anchor="ctr"/>
+                </a:tc>
+                <a:tc>
+                  <a:txBody>
+                    <a:bodyPr/>
+                    <a:lstStyle/>
+                    <a:p>
+                      <a:pPr marL="0" marR="0" indent="0" algn="ctr" defTabSz="914400" rtl="0" eaLnBrk="1" fontAlgn="auto" latinLnBrk="0" hangingPunct="1">
+                        <a:lnSpc>
+                          <a:spcPct val="100000"/>
+                        </a:lnSpc>
+                        <a:spcBef>
+                          <a:spcPts val="0"/>
+                        </a:spcBef>
+                        <a:spcAft>
+                          <a:spcPts val="0"/>
+                        </a:spcAft>
+                        <a:buClrTx/>
+                        <a:buSzTx/>
+                        <a:buFontTx/>
+                        <a:buNone/>
+                        <a:tabLst/>
+                        <a:defRPr/>
+                      </a:pPr>
+                      <a:r>
+                        <a:rPr lang="es-ES" dirty="0" smtClean="0"/>
+                        <a:t>Escritorio y cliente</a:t>
+                      </a:r>
+                      <a:r>
+                        <a:rPr lang="es-ES" baseline="0" dirty="0" smtClean="0"/>
+                        <a:t> web limitado</a:t>
+                      </a:r>
+                      <a:endParaRPr lang="es-ES" dirty="0" smtClean="0"/>
+                    </a:p>
+                  </a:txBody>
+                  <a:tcPr anchor="ctr"/>
+                </a:tc>
+                <a:tc>
+                  <a:txBody>
+                    <a:bodyPr/>
+                    <a:lstStyle/>
+                    <a:p>
+                      <a:pPr marL="0" marR="0" indent="0" algn="ctr" defTabSz="914400" rtl="0" eaLnBrk="1" fontAlgn="auto" latinLnBrk="0" hangingPunct="1">
+                        <a:lnSpc>
+                          <a:spcPct val="100000"/>
+                        </a:lnSpc>
+                        <a:spcBef>
+                          <a:spcPts val="0"/>
+                        </a:spcBef>
+                        <a:spcAft>
+                          <a:spcPts val="0"/>
+                        </a:spcAft>
+                        <a:buClrTx/>
+                        <a:buSzTx/>
+                        <a:buFontTx/>
+                        <a:buNone/>
+                        <a:tabLst/>
+                        <a:defRPr/>
+                      </a:pPr>
+                      <a:r>
+                        <a:rPr lang="es-ES" dirty="0" smtClean="0"/>
+                        <a:t>Cliente web y de escritorio</a:t>
+                      </a:r>
+                      <a:endParaRPr lang="es-ES" dirty="0" smtClean="0"/>
+                    </a:p>
+                  </a:txBody>
+                  <a:tcPr anchor="ctr"/>
+                </a:tc>
+                <a:tc>
+                  <a:txBody>
+                    <a:bodyPr/>
+                    <a:lstStyle/>
+                    <a:p>
+                      <a:pPr algn="ctr"/>
+                      <a:r>
+                        <a:rPr lang="es-ES" dirty="0" smtClean="0"/>
+                        <a:t>Escritorio</a:t>
+                      </a:r>
+                      <a:endParaRPr lang="es-ES" dirty="0"/>
+                    </a:p>
+                  </a:txBody>
+                  <a:tcPr anchor="ctr"/>
+                </a:tc>
+              </a:tr>
+            </a:tbl>
+          </a:graphicData>
+        </a:graphic>
+      </p:graphicFrame>
     </p:spTree>
   </p:cSld>
   <p:clrMapOvr>
@@ -4734,74 +5814,418 @@
             <p:ph type="title"/>
           </p:nvPr>
         </p:nvSpPr>
-        <p:spPr/>
+        <p:spPr>
+          <a:xfrm>
+            <a:off x="0" y="260648"/>
+            <a:ext cx="5482952" cy="792088"/>
+          </a:xfrm>
+        </p:spPr>
         <p:txBody>
           <a:bodyPr/>
           <a:lstStyle/>
           <a:p>
             <a:r>
-              <a:rPr lang="es-ES" dirty="0" err="1" smtClean="0"/>
-              <a:t>Odoo</a:t>
-            </a:r>
-            <a:r>
-              <a:rPr lang="es-ES" dirty="0" smtClean="0"/>
-              <a:t> y webERP: ventajas</a:t>
+              <a:rPr lang="es-ES" dirty="0" smtClean="0"/>
+              <a:t>Comparativa</a:t>
             </a:r>
             <a:endParaRPr lang="es-ES" dirty="0"/>
           </a:p>
         </p:txBody>
       </p:sp>
-      <p:sp>
-        <p:nvSpPr>
-          <p:cNvPr id="3" name="2 Marcador de contenido"/>
-          <p:cNvSpPr>
-            <a:spLocks noGrp="1"/>
-          </p:cNvSpPr>
+      <p:graphicFrame>
+        <p:nvGraphicFramePr>
+          <p:cNvPr id="4" name="3 Marcador de contenido"/>
+          <p:cNvGraphicFramePr>
+            <a:graphicFrameLocks noGrp="1"/>
+          </p:cNvGraphicFramePr>
           <p:nvPr>
             <p:ph idx="1"/>
           </p:nvPr>
-        </p:nvSpPr>
-        <p:spPr/>
-        <p:txBody>
-          <a:bodyPr>
-            <a:normAutofit/>
-          </a:bodyPr>
-          <a:lstStyle/>
-          <a:p>
-            <a:r>
-              <a:rPr lang="es-ES" dirty="0" smtClean="0"/>
-              <a:t>Es posible crear nuevas distribuciones del software y desarrollar módulos o modificar los existentes</a:t>
-            </a:r>
-          </a:p>
-          <a:p>
-            <a:r>
-              <a:rPr lang="es-ES" dirty="0" smtClean="0"/>
-              <a:t>No se depende de una empresa específica para el mantenimiento</a:t>
-            </a:r>
-          </a:p>
-          <a:p>
-            <a:r>
-              <a:rPr lang="es-ES" dirty="0" smtClean="0"/>
-              <a:t>Información a tiempo real</a:t>
-            </a:r>
-          </a:p>
-          <a:p>
-            <a:r>
-              <a:rPr lang="es-ES" dirty="0" smtClean="0"/>
-              <a:t>Crea un entorno de trabajo más eficiente</a:t>
-            </a:r>
-          </a:p>
-          <a:p>
-            <a:r>
-              <a:rPr lang="es-ES" dirty="0" smtClean="0"/>
-              <a:t>Interfaz de usuario adaptable</a:t>
-            </a:r>
-          </a:p>
-          <a:p>
-            <a:endParaRPr lang="es-ES" dirty="0"/>
-          </a:p>
-        </p:txBody>
-      </p:sp>
+        </p:nvGraphicFramePr>
+        <p:xfrm>
+          <a:off x="467544" y="1196752"/>
+          <a:ext cx="8229601" cy="5173302"/>
+        </p:xfrm>
+        <a:graphic>
+          <a:graphicData uri="http://schemas.openxmlformats.org/drawingml/2006/table">
+            <a:tbl>
+              <a:tblPr firstRow="1" bandRow="1">
+                <a:tableStyleId>{5C22544A-7EE6-4342-B048-85BDC9FD1C3A}</a:tableStyleId>
+              </a:tblPr>
+              <a:tblGrid>
+                <a:gridCol w="576064"/>
+                <a:gridCol w="2448272"/>
+                <a:gridCol w="2664296"/>
+                <a:gridCol w="2540969"/>
+              </a:tblGrid>
+              <a:tr h="504056">
+                <a:tc>
+                  <a:txBody>
+                    <a:bodyPr/>
+                    <a:lstStyle/>
+                    <a:p>
+                      <a:pPr algn="ctr"/>
+                      <a:endParaRPr lang="es-ES" dirty="0"/>
+                    </a:p>
+                  </a:txBody>
+                  <a:tcPr anchor="ctr"/>
+                </a:tc>
+                <a:tc>
+                  <a:txBody>
+                    <a:bodyPr/>
+                    <a:lstStyle/>
+                    <a:p>
+                      <a:pPr algn="ctr"/>
+                      <a:r>
+                        <a:rPr lang="es-ES" dirty="0" smtClean="0"/>
+                        <a:t>Sap</a:t>
+                      </a:r>
+                      <a:endParaRPr lang="es-ES" dirty="0"/>
+                    </a:p>
+                  </a:txBody>
+                  <a:tcPr anchor="ctr"/>
+                </a:tc>
+                <a:tc>
+                  <a:txBody>
+                    <a:bodyPr/>
+                    <a:lstStyle/>
+                    <a:p>
+                      <a:pPr algn="ctr"/>
+                      <a:r>
+                        <a:rPr lang="es-ES" dirty="0" smtClean="0"/>
+                        <a:t>Odoo</a:t>
+                      </a:r>
+                      <a:endParaRPr lang="es-ES" dirty="0"/>
+                    </a:p>
+                  </a:txBody>
+                  <a:tcPr anchor="ctr"/>
+                </a:tc>
+                <a:tc>
+                  <a:txBody>
+                    <a:bodyPr/>
+                    <a:lstStyle/>
+                    <a:p>
+                      <a:pPr algn="ctr"/>
+                      <a:r>
+                        <a:rPr lang="es-ES" dirty="0" smtClean="0"/>
+                        <a:t>webERP</a:t>
+                      </a:r>
+                      <a:endParaRPr lang="es-ES" dirty="0"/>
+                    </a:p>
+                  </a:txBody>
+                  <a:tcPr anchor="ctr"/>
+                </a:tc>
+              </a:tr>
+              <a:tr h="1392019">
+                <a:tc>
+                  <a:txBody>
+                    <a:bodyPr/>
+                    <a:lstStyle/>
+                    <a:p>
+                      <a:pPr algn="ctr"/>
+                      <a:r>
+                        <a:rPr lang="es-ES" sz="1400" dirty="0" smtClean="0"/>
+                        <a:t>Integración</a:t>
+                      </a:r>
+                      <a:endParaRPr lang="es-ES" sz="1400" dirty="0"/>
+                    </a:p>
+                  </a:txBody>
+                  <a:tcPr vert="vert270" anchor="ctr"/>
+                </a:tc>
+                <a:tc>
+                  <a:txBody>
+                    <a:bodyPr/>
+                    <a:lstStyle/>
+                    <a:p>
+                      <a:pPr algn="ctr"/>
+                      <a:r>
+                        <a:rPr lang="es-ES" dirty="0" smtClean="0"/>
+                        <a:t>Aplicaciones</a:t>
+                      </a:r>
+                      <a:r>
+                        <a:rPr lang="es-ES" baseline="0" dirty="0" smtClean="0"/>
+                        <a:t> </a:t>
+                      </a:r>
+                      <a:r>
+                        <a:rPr lang="es-ES" dirty="0" smtClean="0"/>
+                        <a:t>CRM, Middleware y la nube</a:t>
+                      </a:r>
+                      <a:endParaRPr lang="es-ES" dirty="0"/>
+                    </a:p>
+                  </a:txBody>
+                  <a:tcPr anchor="ctr"/>
+                </a:tc>
+                <a:tc>
+                  <a:txBody>
+                    <a:bodyPr/>
+                    <a:lstStyle/>
+                    <a:p>
+                      <a:pPr algn="ctr"/>
+                      <a:r>
+                        <a:rPr lang="es-ES" dirty="0" smtClean="0"/>
+                        <a:t>Se pueden comprar aplicaciones de distintos autores</a:t>
+                      </a:r>
+                      <a:r>
+                        <a:rPr lang="es-ES" baseline="0" dirty="0" smtClean="0"/>
+                        <a:t> o desarrollarlas</a:t>
+                      </a:r>
+                      <a:endParaRPr lang="es-ES" dirty="0"/>
+                    </a:p>
+                  </a:txBody>
+                  <a:tcPr anchor="ctr"/>
+                </a:tc>
+                <a:tc>
+                  <a:txBody>
+                    <a:bodyPr/>
+                    <a:lstStyle/>
+                    <a:p>
+                      <a:pPr algn="ctr"/>
+                      <a:r>
+                        <a:rPr lang="es-ES" sz="1800" dirty="0" smtClean="0"/>
+                        <a:t>Se pueden comprar aplicaciones de distintos autores</a:t>
+                      </a:r>
+                      <a:r>
+                        <a:rPr lang="es-ES" sz="1800" baseline="0" dirty="0" smtClean="0"/>
+                        <a:t> o desarrollarlas</a:t>
+                      </a:r>
+                      <a:endParaRPr lang="es-ES" sz="1800" dirty="0"/>
+                    </a:p>
+                  </a:txBody>
+                  <a:tcPr anchor="ctr"/>
+                </a:tc>
+              </a:tr>
+              <a:tr h="1612998">
+                <a:tc>
+                  <a:txBody>
+                    <a:bodyPr/>
+                    <a:lstStyle/>
+                    <a:p>
+                      <a:pPr algn="ctr"/>
+                      <a:r>
+                        <a:rPr lang="es-ES" sz="1400" dirty="0" smtClean="0"/>
+                        <a:t>Soporte técnico</a:t>
+                      </a:r>
+                      <a:endParaRPr lang="es-ES" sz="1400" dirty="0"/>
+                    </a:p>
+                  </a:txBody>
+                  <a:tcPr vert="vert270" anchor="ctr"/>
+                </a:tc>
+                <a:tc>
+                  <a:txBody>
+                    <a:bodyPr/>
+                    <a:lstStyle/>
+                    <a:p>
+                      <a:pPr algn="ctr"/>
+                      <a:r>
+                        <a:rPr lang="es-ES" dirty="0" smtClean="0"/>
+                        <a:t>Online, telefónico, documentación</a:t>
+                      </a:r>
+                      <a:endParaRPr lang="es-ES" dirty="0"/>
+                    </a:p>
+                  </a:txBody>
+                  <a:tcPr anchor="ctr"/>
+                </a:tc>
+                <a:tc>
+                  <a:txBody>
+                    <a:bodyPr/>
+                    <a:lstStyle/>
+                    <a:p>
+                      <a:pPr marL="0" marR="0" indent="0" algn="ctr" defTabSz="914400" rtl="0" eaLnBrk="1" fontAlgn="auto" latinLnBrk="0" hangingPunct="1">
+                        <a:lnSpc>
+                          <a:spcPct val="100000"/>
+                        </a:lnSpc>
+                        <a:spcBef>
+                          <a:spcPts val="0"/>
+                        </a:spcBef>
+                        <a:spcAft>
+                          <a:spcPts val="0"/>
+                        </a:spcAft>
+                        <a:buClrTx/>
+                        <a:buSzTx/>
+                        <a:buFontTx/>
+                        <a:buNone/>
+                        <a:tabLst/>
+                        <a:defRPr/>
+                      </a:pPr>
+                      <a:r>
+                        <a:rPr lang="es-ES" dirty="0" smtClean="0"/>
+                        <a:t>24/7 de lunes a viernes</a:t>
+                      </a:r>
+                      <a:r>
+                        <a:rPr lang="es-ES" baseline="0" dirty="0" smtClean="0"/>
+                        <a:t> con t</a:t>
+                      </a:r>
+                      <a:r>
+                        <a:rPr lang="es-ES" dirty="0" smtClean="0"/>
+                        <a:t>ickets de soporte y teléfonos de emergencia. Foros de la</a:t>
+                      </a:r>
+                      <a:r>
+                        <a:rPr lang="es-ES" baseline="0" dirty="0" smtClean="0"/>
+                        <a:t> </a:t>
+                      </a:r>
+                      <a:r>
+                        <a:rPr lang="es-ES" dirty="0" smtClean="0"/>
+                        <a:t>comunidad</a:t>
+                      </a:r>
+                    </a:p>
+                  </a:txBody>
+                  <a:tcPr anchor="ctr"/>
+                </a:tc>
+                <a:tc>
+                  <a:txBody>
+                    <a:bodyPr/>
+                    <a:lstStyle/>
+                    <a:p>
+                      <a:pPr marL="0" marR="0" indent="0" algn="ctr" defTabSz="914400" rtl="0" eaLnBrk="1" fontAlgn="auto" latinLnBrk="0" hangingPunct="1">
+                        <a:lnSpc>
+                          <a:spcPct val="100000"/>
+                        </a:lnSpc>
+                        <a:spcBef>
+                          <a:spcPts val="0"/>
+                        </a:spcBef>
+                        <a:spcAft>
+                          <a:spcPts val="0"/>
+                        </a:spcAft>
+                        <a:buClrTx/>
+                        <a:buSzTx/>
+                        <a:buFontTx/>
+                        <a:buNone/>
+                        <a:tabLst/>
+                        <a:defRPr/>
+                      </a:pPr>
+                      <a:r>
+                        <a:rPr lang="es-ES" dirty="0" smtClean="0"/>
+                        <a:t>Manuales, foros y listas de correo</a:t>
+                      </a:r>
+                    </a:p>
+                  </a:txBody>
+                  <a:tcPr anchor="ctr"/>
+                </a:tc>
+              </a:tr>
+              <a:tr h="1664229">
+                <a:tc>
+                  <a:txBody>
+                    <a:bodyPr/>
+                    <a:lstStyle/>
+                    <a:p>
+                      <a:pPr algn="ctr"/>
+                      <a:r>
+                        <a:rPr lang="es-ES" sz="1400" dirty="0" smtClean="0"/>
+                        <a:t>Desarrollos</a:t>
+                      </a:r>
+                    </a:p>
+                    <a:p>
+                      <a:pPr algn="ctr"/>
+                      <a:r>
+                        <a:rPr lang="es-ES" sz="1400" dirty="0" smtClean="0"/>
+                        <a:t>a medida</a:t>
+                      </a:r>
+                      <a:endParaRPr lang="es-ES" sz="1400" dirty="0"/>
+                    </a:p>
+                  </a:txBody>
+                  <a:tcPr vert="vert270" anchor="ctr"/>
+                </a:tc>
+                <a:tc>
+                  <a:txBody>
+                    <a:bodyPr/>
+                    <a:lstStyle/>
+                    <a:p>
+                      <a:pPr marL="0" marR="0" indent="0" algn="ctr" defTabSz="914400" rtl="0" eaLnBrk="1" fontAlgn="auto" latinLnBrk="0" hangingPunct="1">
+                        <a:lnSpc>
+                          <a:spcPct val="100000"/>
+                        </a:lnSpc>
+                        <a:spcBef>
+                          <a:spcPts val="0"/>
+                        </a:spcBef>
+                        <a:spcAft>
+                          <a:spcPts val="0"/>
+                        </a:spcAft>
+                        <a:buClrTx/>
+                        <a:buSzTx/>
+                        <a:buFontTx/>
+                        <a:buNone/>
+                        <a:tabLst/>
+                        <a:defRPr/>
+                      </a:pPr>
+                      <a:r>
+                        <a:rPr lang="es-ES" dirty="0" smtClean="0"/>
+                        <a:t>Hay adaptaciones, pero no hay desarrollos a medida como tal</a:t>
+                      </a:r>
+                      <a:endParaRPr lang="es-ES" dirty="0" smtClean="0"/>
+                    </a:p>
+                  </a:txBody>
+                  <a:tcPr anchor="ctr"/>
+                </a:tc>
+                <a:tc>
+                  <a:txBody>
+                    <a:bodyPr/>
+                    <a:lstStyle/>
+                    <a:p>
+                      <a:pPr marL="0" marR="0" indent="0" algn="ctr" defTabSz="914400" rtl="0" eaLnBrk="1" fontAlgn="auto" latinLnBrk="0" hangingPunct="1">
+                        <a:lnSpc>
+                          <a:spcPct val="100000"/>
+                        </a:lnSpc>
+                        <a:spcBef>
+                          <a:spcPts val="0"/>
+                        </a:spcBef>
+                        <a:spcAft>
+                          <a:spcPts val="0"/>
+                        </a:spcAft>
+                        <a:buClrTx/>
+                        <a:buSzTx/>
+                        <a:buFontTx/>
+                        <a:buNone/>
+                        <a:tabLst/>
+                        <a:defRPr/>
+                      </a:pPr>
+                      <a:r>
+                        <a:rPr lang="es-ES" dirty="0" smtClean="0"/>
+                        <a:t>Se pueden hacer ya que es software libre</a:t>
+                      </a:r>
+                      <a:endParaRPr lang="es-ES" dirty="0" smtClean="0"/>
+                    </a:p>
+                  </a:txBody>
+                  <a:tcPr anchor="ctr"/>
+                </a:tc>
+                <a:tc>
+                  <a:txBody>
+                    <a:bodyPr/>
+                    <a:lstStyle/>
+                    <a:p>
+                      <a:pPr marL="0" marR="0" indent="0" algn="ctr" defTabSz="914400" rtl="0" eaLnBrk="1" fontAlgn="auto" latinLnBrk="0" hangingPunct="1">
+                        <a:lnSpc>
+                          <a:spcPct val="100000"/>
+                        </a:lnSpc>
+                        <a:spcBef>
+                          <a:spcPts val="0"/>
+                        </a:spcBef>
+                        <a:spcAft>
+                          <a:spcPts val="0"/>
+                        </a:spcAft>
+                        <a:buClrTx/>
+                        <a:buSzTx/>
+                        <a:buFontTx/>
+                        <a:buNone/>
+                        <a:tabLst/>
+                        <a:defRPr/>
+                      </a:pPr>
+                      <a:r>
+                        <a:rPr lang="es-ES" dirty="0" smtClean="0"/>
+                        <a:t>Se pueden hacer ya que es software libre</a:t>
+                      </a:r>
+                    </a:p>
+                    <a:p>
+                      <a:pPr algn="ctr"/>
+                      <a:endParaRPr lang="es-ES" dirty="0"/>
+                    </a:p>
+                  </a:txBody>
+                  <a:tcPr anchor="ctr"/>
+                </a:tc>
+              </a:tr>
+            </a:tbl>
+          </a:graphicData>
+        </a:graphic>
+      </p:graphicFrame>
     </p:spTree>
   </p:cSld>
   <p:clrMapOvr>

</xml_diff>